<commit_message>
add markdown cheat sheet link
</commit_message>
<xml_diff>
--- a/ppt/Jupyter-Notebooks-101.pptx
+++ b/ppt/Jupyter-Notebooks-101.pptx
@@ -278,7 +278,7 @@
           <a:p>
             <a:fld id="{412A36AD-C140-47B5-A0AA-2808AF1C1C9D}" type="datetimeFigureOut">
               <a:rPr lang="en-AU" smtClean="0"/>
-              <a:t>14/9/2023</a:t>
+              <a:t>20/9/2023</a:t>
             </a:fld>
             <a:endParaRPr lang="en-AU"/>
           </a:p>
@@ -443,7 +443,7 @@
           <a:p>
             <a:fld id="{2763829E-EB69-4A98-9D54-8D6822520B27}" type="datetimeFigureOut">
               <a:rPr lang="en-AU" smtClean="0"/>
-              <a:t>14/9/2023</a:t>
+              <a:t>20/9/2023</a:t>
             </a:fld>
             <a:endParaRPr lang="en-AU"/>
           </a:p>
@@ -10978,13 +10978,13 @@
   <p:clrMapOvr>
     <a:masterClrMapping/>
   </p:clrMapOvr>
-  <mc:AlternateContent xmlns:mc="http://schemas.openxmlformats.org/markup-compatibility/2006">
-    <mc:Choice xmlns:p14="http://schemas.microsoft.com/office/powerpoint/2010/main" Requires="p14">
+  <mc:AlternateContent xmlns:mc="http://schemas.openxmlformats.org/markup-compatibility/2006" xmlns:p14="http://schemas.microsoft.com/office/powerpoint/2010/main">
+    <mc:Choice Requires="p14">
       <p:transition spd="med" p14:dur="700">
         <p:fade/>
       </p:transition>
     </mc:Choice>
-    <mc:Fallback>
+    <mc:Fallback xmlns="">
       <p:transition spd="med">
         <p:fade/>
       </p:transition>
@@ -11602,13 +11602,13 @@
   <p:clrMapOvr>
     <a:masterClrMapping/>
   </p:clrMapOvr>
-  <mc:AlternateContent xmlns:mc="http://schemas.openxmlformats.org/markup-compatibility/2006">
-    <mc:Choice xmlns:p14="http://schemas.microsoft.com/office/powerpoint/2010/main" Requires="p14">
+  <mc:AlternateContent xmlns:mc="http://schemas.openxmlformats.org/markup-compatibility/2006" xmlns:p14="http://schemas.microsoft.com/office/powerpoint/2010/main">
+    <mc:Choice Requires="p14">
       <p:transition spd="med" p14:dur="700">
         <p:fade/>
       </p:transition>
     </mc:Choice>
-    <mc:Fallback>
+    <mc:Fallback xmlns="">
       <p:transition spd="med">
         <p:fade/>
       </p:transition>
@@ -12037,13 +12037,13 @@
   <p:clrMapOvr>
     <a:masterClrMapping/>
   </p:clrMapOvr>
-  <mc:AlternateContent xmlns:mc="http://schemas.openxmlformats.org/markup-compatibility/2006">
-    <mc:Choice xmlns:p14="http://schemas.microsoft.com/office/powerpoint/2010/main" Requires="p14">
+  <mc:AlternateContent xmlns:mc="http://schemas.openxmlformats.org/markup-compatibility/2006" xmlns:p14="http://schemas.microsoft.com/office/powerpoint/2010/main">
+    <mc:Choice Requires="p14">
       <p:transition spd="med" p14:dur="700">
         <p:fade/>
       </p:transition>
     </mc:Choice>
-    <mc:Fallback>
+    <mc:Fallback xmlns="">
       <p:transition spd="med">
         <p:fade/>
       </p:transition>
@@ -13020,13 +13020,13 @@
   <p:clrMapOvr>
     <a:masterClrMapping/>
   </p:clrMapOvr>
-  <mc:AlternateContent xmlns:mc="http://schemas.openxmlformats.org/markup-compatibility/2006">
-    <mc:Choice xmlns:p14="http://schemas.microsoft.com/office/powerpoint/2010/main" Requires="p14">
+  <mc:AlternateContent xmlns:mc="http://schemas.openxmlformats.org/markup-compatibility/2006" xmlns:p14="http://schemas.microsoft.com/office/powerpoint/2010/main">
+    <mc:Choice Requires="p14">
       <p:transition spd="med" p14:dur="700">
         <p:fade/>
       </p:transition>
     </mc:Choice>
-    <mc:Fallback>
+    <mc:Fallback xmlns="">
       <p:transition spd="med">
         <p:fade/>
       </p:transition>
@@ -13869,13 +13869,13 @@
   <p:clrMapOvr>
     <a:masterClrMapping/>
   </p:clrMapOvr>
-  <mc:AlternateContent xmlns:mc="http://schemas.openxmlformats.org/markup-compatibility/2006">
-    <mc:Choice xmlns:p14="http://schemas.microsoft.com/office/powerpoint/2010/main" Requires="p14">
+  <mc:AlternateContent xmlns:mc="http://schemas.openxmlformats.org/markup-compatibility/2006" xmlns:p14="http://schemas.microsoft.com/office/powerpoint/2010/main">
+    <mc:Choice Requires="p14">
       <p:transition spd="med" p14:dur="700">
         <p:fade/>
       </p:transition>
     </mc:Choice>
-    <mc:Fallback>
+    <mc:Fallback xmlns="">
       <p:transition spd="med">
         <p:fade/>
       </p:transition>
@@ -14575,13 +14575,13 @@
   <p:clrMapOvr>
     <a:masterClrMapping/>
   </p:clrMapOvr>
-  <mc:AlternateContent xmlns:mc="http://schemas.openxmlformats.org/markup-compatibility/2006">
-    <mc:Choice xmlns:p14="http://schemas.microsoft.com/office/powerpoint/2010/main" Requires="p14">
+  <mc:AlternateContent xmlns:mc="http://schemas.openxmlformats.org/markup-compatibility/2006" xmlns:p14="http://schemas.microsoft.com/office/powerpoint/2010/main">
+    <mc:Choice Requires="p14">
       <p:transition spd="med" p14:dur="700">
         <p:fade/>
       </p:transition>
     </mc:Choice>
-    <mc:Fallback>
+    <mc:Fallback xmlns="">
       <p:transition spd="med">
         <p:fade/>
       </p:transition>
@@ -15278,13 +15278,13 @@
   <p:clrMapOvr>
     <a:masterClrMapping/>
   </p:clrMapOvr>
-  <mc:AlternateContent xmlns:mc="http://schemas.openxmlformats.org/markup-compatibility/2006">
-    <mc:Choice xmlns:p14="http://schemas.microsoft.com/office/powerpoint/2010/main" Requires="p14">
+  <mc:AlternateContent xmlns:mc="http://schemas.openxmlformats.org/markup-compatibility/2006" xmlns:p14="http://schemas.microsoft.com/office/powerpoint/2010/main">
+    <mc:Choice Requires="p14">
       <p:transition spd="med" p14:dur="700">
         <p:fade/>
       </p:transition>
     </mc:Choice>
-    <mc:Fallback>
+    <mc:Fallback xmlns="">
       <p:transition spd="med">
         <p:fade/>
       </p:transition>
@@ -15705,13 +15705,13 @@
   <p:clrMapOvr>
     <a:masterClrMapping/>
   </p:clrMapOvr>
-  <mc:AlternateContent xmlns:mc="http://schemas.openxmlformats.org/markup-compatibility/2006">
-    <mc:Choice xmlns:p14="http://schemas.microsoft.com/office/powerpoint/2010/main" Requires="p14">
+  <mc:AlternateContent xmlns:mc="http://schemas.openxmlformats.org/markup-compatibility/2006" xmlns:p14="http://schemas.microsoft.com/office/powerpoint/2010/main">
+    <mc:Choice Requires="p14">
       <p:transition spd="med" p14:dur="700">
         <p:fade/>
       </p:transition>
     </mc:Choice>
-    <mc:Fallback>
+    <mc:Fallback xmlns="">
       <p:transition spd="med">
         <p:fade/>
       </p:transition>
@@ -20566,13 +20566,13 @@
   <p:clrMapOvr>
     <a:masterClrMapping/>
   </p:clrMapOvr>
-  <mc:AlternateContent xmlns:mc="http://schemas.openxmlformats.org/markup-compatibility/2006">
-    <mc:Choice xmlns:p14="http://schemas.microsoft.com/office/powerpoint/2010/main" Requires="p14">
+  <mc:AlternateContent xmlns:mc="http://schemas.openxmlformats.org/markup-compatibility/2006" xmlns:p14="http://schemas.microsoft.com/office/powerpoint/2010/main">
+    <mc:Choice Requires="p14">
       <p:transition spd="med" p14:dur="700">
         <p:fade/>
       </p:transition>
     </mc:Choice>
-    <mc:Fallback>
+    <mc:Fallback xmlns="">
       <p:transition spd="med">
         <p:fade/>
       </p:transition>
@@ -21049,13 +21049,13 @@
   <p:clrMapOvr>
     <a:masterClrMapping/>
   </p:clrMapOvr>
-  <mc:AlternateContent xmlns:mc="http://schemas.openxmlformats.org/markup-compatibility/2006">
-    <mc:Choice xmlns:p14="http://schemas.microsoft.com/office/powerpoint/2010/main" Requires="p14">
+  <mc:AlternateContent xmlns:mc="http://schemas.openxmlformats.org/markup-compatibility/2006" xmlns:p14="http://schemas.microsoft.com/office/powerpoint/2010/main">
+    <mc:Choice Requires="p14">
       <p:transition spd="med" p14:dur="700">
         <p:fade/>
       </p:transition>
     </mc:Choice>
-    <mc:Fallback>
+    <mc:Fallback xmlns="">
       <p:transition spd="med">
         <p:fade/>
       </p:transition>
@@ -21678,13 +21678,13 @@
   <p:clrMapOvr>
     <a:masterClrMapping/>
   </p:clrMapOvr>
-  <mc:AlternateContent xmlns:mc="http://schemas.openxmlformats.org/markup-compatibility/2006">
-    <mc:Choice xmlns:p14="http://schemas.microsoft.com/office/powerpoint/2010/main" Requires="p14">
+  <mc:AlternateContent xmlns:mc="http://schemas.openxmlformats.org/markup-compatibility/2006" xmlns:p14="http://schemas.microsoft.com/office/powerpoint/2010/main">
+    <mc:Choice Requires="p14">
       <p:transition spd="med" p14:dur="700">
         <p:fade/>
       </p:transition>
     </mc:Choice>
-    <mc:Fallback>
+    <mc:Fallback xmlns="">
       <p:transition spd="med">
         <p:fade/>
       </p:transition>
@@ -22378,13 +22378,13 @@
   <p:clrMapOvr>
     <a:masterClrMapping/>
   </p:clrMapOvr>
-  <mc:AlternateContent xmlns:mc="http://schemas.openxmlformats.org/markup-compatibility/2006">
-    <mc:Choice xmlns:p14="http://schemas.microsoft.com/office/powerpoint/2010/main" Requires="p14">
+  <mc:AlternateContent xmlns:mc="http://schemas.openxmlformats.org/markup-compatibility/2006" xmlns:p14="http://schemas.microsoft.com/office/powerpoint/2010/main">
+    <mc:Choice Requires="p14">
       <p:transition spd="med" p14:dur="700">
         <p:fade/>
       </p:transition>
     </mc:Choice>
-    <mc:Fallback>
+    <mc:Fallback xmlns="">
       <p:transition spd="med">
         <p:fade/>
       </p:transition>

</xml_diff>